<commit_message>
Added a picture to help explain fill density. Changed "Other Changes" to "Other Issues"
</commit_message>
<xml_diff>
--- a/Status Updates/2013 11 14.pptx
+++ b/Status Updates/2013 11 14.pptx
@@ -9,9 +9,10 @@
     <p:sldId id="257" r:id="rId3"/>
     <p:sldId id="258" r:id="rId4"/>
     <p:sldId id="259" r:id="rId5"/>
-    <p:sldId id="260" r:id="rId6"/>
-    <p:sldId id="261" r:id="rId7"/>
-    <p:sldId id="262" r:id="rId8"/>
+    <p:sldId id="263" r:id="rId6"/>
+    <p:sldId id="260" r:id="rId7"/>
+    <p:sldId id="261" r:id="rId8"/>
+    <p:sldId id="262" r:id="rId9"/>
   </p:sldIdLst>
   <p:sldSz cx="9144000" cy="6858000" type="screen4x3"/>
   <p:notesSz cx="7010400" cy="9296400"/>
@@ -112,7 +113,7 @@
   </p:defaultTextStyle>
   <p:extLst>
     <p:ext uri="{EFAFB233-063F-42B5-8137-9DF3F51BA10A}">
-      <p15:sldGuideLst xmlns:p15="http://schemas.microsoft.com/office/powerpoint/2012/main">
+      <p15:sldGuideLst xmlns:p15="http://schemas.microsoft.com/office/powerpoint/2012/main" xmlns="">
         <p15:guide id="1" orient="horz" pos="2160">
           <p15:clr>
             <a:srgbClr val="A4A3A4"/>
@@ -323,7 +324,7 @@
           <a:p>
             <a:fld id="{B790700D-980F-41A9-9E1A-E28F7DB87F53}" type="datetimeFigureOut">
               <a:rPr lang="en-US" smtClean="0"/>
-              <a:t>11/14/2013</a:t>
+              <a:t>11/14/13</a:t>
             </a:fld>
             <a:endParaRPr lang="en-US"/>
           </a:p>
@@ -488,7 +489,7 @@
           <a:p>
             <a:fld id="{B790700D-980F-41A9-9E1A-E28F7DB87F53}" type="datetimeFigureOut">
               <a:rPr lang="en-US" smtClean="0"/>
-              <a:t>11/14/2013</a:t>
+              <a:t>11/14/13</a:t>
             </a:fld>
             <a:endParaRPr lang="en-US"/>
           </a:p>
@@ -663,7 +664,7 @@
           <a:p>
             <a:fld id="{B790700D-980F-41A9-9E1A-E28F7DB87F53}" type="datetimeFigureOut">
               <a:rPr lang="en-US" smtClean="0"/>
-              <a:t>11/14/2013</a:t>
+              <a:t>11/14/13</a:t>
             </a:fld>
             <a:endParaRPr lang="en-US"/>
           </a:p>
@@ -828,7 +829,7 @@
           <a:p>
             <a:fld id="{B790700D-980F-41A9-9E1A-E28F7DB87F53}" type="datetimeFigureOut">
               <a:rPr lang="en-US" smtClean="0"/>
-              <a:t>11/14/2013</a:t>
+              <a:t>11/14/13</a:t>
             </a:fld>
             <a:endParaRPr lang="en-US"/>
           </a:p>
@@ -1069,7 +1070,7 @@
           <a:p>
             <a:fld id="{B790700D-980F-41A9-9E1A-E28F7DB87F53}" type="datetimeFigureOut">
               <a:rPr lang="en-US" smtClean="0"/>
-              <a:t>11/14/2013</a:t>
+              <a:t>11/14/13</a:t>
             </a:fld>
             <a:endParaRPr lang="en-US"/>
           </a:p>
@@ -1352,7 +1353,7 @@
           <a:p>
             <a:fld id="{B790700D-980F-41A9-9E1A-E28F7DB87F53}" type="datetimeFigureOut">
               <a:rPr lang="en-US" smtClean="0"/>
-              <a:t>11/14/2013</a:t>
+              <a:t>11/14/13</a:t>
             </a:fld>
             <a:endParaRPr lang="en-US"/>
           </a:p>
@@ -1781,7 +1782,7 @@
           <a:p>
             <a:fld id="{B790700D-980F-41A9-9E1A-E28F7DB87F53}" type="datetimeFigureOut">
               <a:rPr lang="en-US" smtClean="0"/>
-              <a:t>11/14/2013</a:t>
+              <a:t>11/14/13</a:t>
             </a:fld>
             <a:endParaRPr lang="en-US"/>
           </a:p>
@@ -1894,7 +1895,7 @@
           <a:p>
             <a:fld id="{B790700D-980F-41A9-9E1A-E28F7DB87F53}" type="datetimeFigureOut">
               <a:rPr lang="en-US" smtClean="0"/>
-              <a:t>11/14/2013</a:t>
+              <a:t>11/14/13</a:t>
             </a:fld>
             <a:endParaRPr lang="en-US"/>
           </a:p>
@@ -1984,7 +1985,7 @@
           <a:p>
             <a:fld id="{B790700D-980F-41A9-9E1A-E28F7DB87F53}" type="datetimeFigureOut">
               <a:rPr lang="en-US" smtClean="0"/>
-              <a:t>11/14/2013</a:t>
+              <a:t>11/14/13</a:t>
             </a:fld>
             <a:endParaRPr lang="en-US"/>
           </a:p>
@@ -2173,7 +2174,7 @@
           <a:p>
             <a:fld id="{B790700D-980F-41A9-9E1A-E28F7DB87F53}" type="datetimeFigureOut">
               <a:rPr lang="en-US" smtClean="0"/>
-              <a:t>11/14/2013</a:t>
+              <a:t>11/14/13</a:t>
             </a:fld>
             <a:endParaRPr lang="en-US"/>
           </a:p>
@@ -2491,7 +2492,7 @@
           <a:p>
             <a:fld id="{B790700D-980F-41A9-9E1A-E28F7DB87F53}" type="datetimeFigureOut">
               <a:rPr lang="en-US" smtClean="0"/>
-              <a:t>11/14/2013</a:t>
+              <a:t>11/14/13</a:t>
             </a:fld>
             <a:endParaRPr lang="en-US"/>
           </a:p>
@@ -2870,7 +2871,7 @@
           <a:p>
             <a:fld id="{B790700D-980F-41A9-9E1A-E28F7DB87F53}" type="datetimeFigureOut">
               <a:rPr lang="en-US" smtClean="0"/>
-              <a:t>11/14/2013</a:t>
+              <a:t>11/14/13</a:t>
             </a:fld>
             <a:endParaRPr lang="en-US"/>
           </a:p>
@@ -3295,7 +3296,7 @@
   <p:timing>
     <p:tnLst>
       <p:par>
-        <p:cTn id="1" dur="indefinite" restart="never" nodeType="tmRoot"/>
+        <p:cTn xmlns:p14="http://schemas.microsoft.com/office/powerpoint/2010/main" id="1" dur="indefinite" restart="never" nodeType="tmRoot"/>
       </p:par>
     </p:tnLst>
   </p:timing>
@@ -3407,8 +3408,13 @@
             </a:r>
             <a:r>
               <a:rPr lang="en-US" sz="2800" dirty="0" smtClean="0"/>
-              <a:t> / Production</a:t>
-            </a:r>
+              <a:t> </a:t>
+            </a:r>
+            <a:r>
+              <a:rPr lang="en-US" sz="2800" dirty="0" smtClean="0"/>
+              <a:t>Production</a:t>
+            </a:r>
+            <a:endParaRPr lang="en-US" sz="2800" dirty="0" smtClean="0"/>
           </a:p>
           <a:p>
             <a:endParaRPr lang="en-US" dirty="0"/>
@@ -3564,14 +3570,14 @@
             <a:noFill/>
           </a:ln>
           <a:extLst>
-            <a:ext uri="{909E8E84-426E-40DD-AFC4-6F175D3DCCD1}">
+            <a:ext uri="{909E8E84-426E-40dd-AFC4-6F175D3DCCD1}">
               <a14:hiddenFill xmlns:a14="http://schemas.microsoft.com/office/drawing/2010/main">
                 <a:solidFill>
                   <a:srgbClr val="FFFFFF"/>
                 </a:solidFill>
               </a14:hiddenFill>
             </a:ext>
-            <a:ext uri="{91240B29-F687-4F45-9708-019B960494DF}">
+            <a:ext uri="{91240B29-F687-4f45-9708-019B960494DF}">
               <a14:hiddenLine xmlns:a14="http://schemas.microsoft.com/office/drawing/2010/main" w="9525">
                 <a:solidFill>
                   <a:srgbClr val="000000"/>
@@ -3618,14 +3624,14 @@
             <a:noFill/>
           </a:ln>
           <a:extLst>
-            <a:ext uri="{909E8E84-426E-40DD-AFC4-6F175D3DCCD1}">
+            <a:ext uri="{909E8E84-426E-40dd-AFC4-6F175D3DCCD1}">
               <a14:hiddenFill xmlns:a14="http://schemas.microsoft.com/office/drawing/2010/main">
                 <a:solidFill>
                   <a:srgbClr val="FFFFFF"/>
                 </a:solidFill>
               </a14:hiddenFill>
             </a:ext>
-            <a:ext uri="{91240B29-F687-4F45-9708-019B960494DF}">
+            <a:ext uri="{91240B29-F687-4f45-9708-019B960494DF}">
               <a14:hiddenLine xmlns:a14="http://schemas.microsoft.com/office/drawing/2010/main" w="9525">
                 <a:solidFill>
                   <a:srgbClr val="000000"/>
@@ -3704,7 +3710,7 @@
         <p:spPr>
           <a:xfrm>
             <a:off x="457200" y="1600200"/>
-            <a:ext cx="7620000" cy="5257800"/>
+            <a:ext cx="7620000" cy="2057400"/>
           </a:xfrm>
         </p:spPr>
         <p:txBody>
@@ -3742,67 +3748,75 @@
             <a:pPr lvl="1"/>
             <a:r>
               <a:rPr lang="en-US" dirty="0" smtClean="0"/>
-              <a:t>Option to conserve material</a:t>
-            </a:r>
-          </a:p>
-          <a:p>
-            <a:endParaRPr lang="en-US" sz="2400" dirty="0" smtClean="0"/>
-          </a:p>
-          <a:p>
-            <a:r>
-              <a:rPr lang="en-US" sz="2400" dirty="0" smtClean="0"/>
-              <a:t>Feedback: </a:t>
-            </a:r>
-            <a:r>
-              <a:rPr lang="en-US" sz="2400" dirty="0"/>
-              <a:t>Ensure that non-critical and feature requirements are accounted for in design</a:t>
-            </a:r>
-          </a:p>
-          <a:p>
-            <a:pPr lvl="1"/>
+              <a:t>Option to conserve </a:t>
+            </a:r>
             <a:r>
               <a:rPr lang="en-US" dirty="0" smtClean="0"/>
-              <a:t>Changes to Req. 8.3: “Modular and Scalable Design”</a:t>
-            </a:r>
-          </a:p>
-          <a:p>
-            <a:endParaRPr lang="en-US" sz="2400" dirty="0" smtClean="0"/>
-          </a:p>
-          <a:p>
-            <a:r>
-              <a:rPr lang="en-US" sz="2400" dirty="0" smtClean="0"/>
-              <a:t>Performance </a:t>
-            </a:r>
-            <a:r>
-              <a:rPr lang="en-US" sz="2400" dirty="0"/>
-              <a:t>Consideration: Model Complexity, Processing </a:t>
-            </a:r>
-            <a:r>
-              <a:rPr lang="en-US" sz="2400" dirty="0" smtClean="0"/>
-              <a:t>Time</a:t>
-            </a:r>
-          </a:p>
-          <a:p>
-            <a:pPr lvl="1"/>
-            <a:r>
-              <a:rPr lang="en-US" dirty="0" smtClean="0"/>
-              <a:t>Now addressed in Req. 5.3: “Object Processing Time”</a:t>
-            </a:r>
-          </a:p>
-          <a:p>
-            <a:pPr lvl="1"/>
-            <a:r>
-              <a:rPr lang="en-US" dirty="0" smtClean="0"/>
-              <a:t>Model must be closed &amp; complete</a:t>
+              <a:t>material</a:t>
+            </a:r>
+          </a:p>
+        </p:txBody>
+      </p:sp>
+      <p:pic>
+        <p:nvPicPr>
+          <p:cNvPr id="5" name="Picture 4"/>
+          <p:cNvPicPr>
+            <a:picLocks noChangeAspect="1"/>
+          </p:cNvPicPr>
+          <p:nvPr/>
+        </p:nvPicPr>
+        <p:blipFill>
+          <a:blip r:embed="rId2"/>
+          <a:stretch>
+            <a:fillRect/>
+          </a:stretch>
+        </p:blipFill>
+        <p:spPr>
+          <a:xfrm>
+            <a:off x="1447800" y="3124200"/>
+            <a:ext cx="5311366" cy="3352800"/>
+          </a:xfrm>
+          <a:prstGeom prst="rect">
+            <a:avLst/>
+          </a:prstGeom>
+        </p:spPr>
+      </p:pic>
+      <p:sp>
+        <p:nvSpPr>
+          <p:cNvPr id="7" name="TextBox 6"/>
+          <p:cNvSpPr txBox="1"/>
+          <p:nvPr/>
+        </p:nvSpPr>
+        <p:spPr>
+          <a:xfrm>
+            <a:off x="0" y="6488668"/>
+            <a:ext cx="8458200" cy="369332"/>
+          </a:xfrm>
+          <a:prstGeom prst="rect">
+            <a:avLst/>
+          </a:prstGeom>
+          <a:noFill/>
+        </p:spPr>
+        <p:txBody>
+          <a:bodyPr wrap="square" rtlCol="0">
+            <a:spAutoFit/>
+          </a:bodyPr>
+          <a:lstStyle/>
+          <a:p>
+            <a:pPr algn="ctr"/>
+            <a:r>
+              <a:rPr lang="nb-NO" dirty="0"/>
+              <a:t>http://</a:t>
+            </a:r>
+            <a:r>
+              <a:rPr lang="nb-NO" dirty="0" err="1"/>
+              <a:t>richrap.blogspot.com</a:t>
+            </a:r>
+            <a:r>
+              <a:rPr lang="nb-NO" dirty="0"/>
+              <a:t>/2012/01/slic3r-is-nicer-part-1-settings-and.html</a:t>
             </a:r>
             <a:endParaRPr lang="en-US" dirty="0"/>
-          </a:p>
-          <a:p>
-            <a:endParaRPr lang="en-US" sz="2400" dirty="0" smtClean="0"/>
-          </a:p>
-          <a:p>
-            <a:pPr lvl="1"/>
-            <a:endParaRPr lang="en-US" dirty="0" smtClean="0"/>
           </a:p>
         </p:txBody>
       </p:sp>
@@ -3876,77 +3890,41 @@
           <a:p>
             <a:r>
               <a:rPr lang="en-US" sz="2400" dirty="0"/>
-              <a:t>Use Cases feels </a:t>
-            </a:r>
-            <a:r>
-              <a:rPr lang="en-US" sz="2400" dirty="0" smtClean="0"/>
-              <a:t>incomplete</a:t>
+              <a:t>Feedback: Ensure that non-critical and feature requirements are accounted for in design</a:t>
             </a:r>
           </a:p>
           <a:p>
             <a:pPr lvl="1"/>
             <a:r>
-              <a:rPr lang="en-US" dirty="0" smtClean="0"/>
-              <a:t>Added new case: “Edit Printer Configuration”</a:t>
+              <a:rPr lang="en-US" dirty="0"/>
+              <a:t>Changes to Req. 8.3: “Modular and Scalable Design”</a:t>
             </a:r>
           </a:p>
           <a:p>
             <a:pPr lvl="1"/>
-            <a:endParaRPr lang="en-US" dirty="0"/>
+            <a:endParaRPr lang="en-US" sz="2400" dirty="0"/>
           </a:p>
           <a:p>
             <a:r>
               <a:rPr lang="en-US" sz="2400" dirty="0"/>
-              <a:t>Feasibility assumptions regarding </a:t>
-            </a:r>
-            <a:r>
-              <a:rPr lang="en-US" sz="2400" dirty="0" err="1"/>
-              <a:t>LoC</a:t>
-            </a:r>
-            <a:r>
-              <a:rPr lang="en-US" sz="2400" dirty="0"/>
-              <a:t> / </a:t>
-            </a:r>
-            <a:r>
-              <a:rPr lang="en-US" sz="2400" dirty="0" smtClean="0"/>
-              <a:t>Production</a:t>
+              <a:t>Performance Consideration: Model Complexity, Processing Time</a:t>
             </a:r>
           </a:p>
           <a:p>
             <a:pPr lvl="1"/>
             <a:r>
-              <a:rPr lang="en-US" dirty="0" smtClean="0"/>
-              <a:t>Familiar with Tools</a:t>
-            </a:r>
-          </a:p>
-          <a:p>
-            <a:pPr lvl="2"/>
-            <a:r>
-              <a:rPr lang="en-US" dirty="0" smtClean="0"/>
-              <a:t>Interface largely Java</a:t>
-            </a:r>
-          </a:p>
-          <a:p>
-            <a:pPr lvl="2"/>
-            <a:r>
-              <a:rPr lang="en-US" dirty="0" smtClean="0"/>
-              <a:t>Processing in C</a:t>
+              <a:rPr lang="en-US" dirty="0"/>
+              <a:t>Now addressed in Req. 5.3: “Object Processing Time”</a:t>
             </a:r>
           </a:p>
           <a:p>
             <a:pPr lvl="1"/>
             <a:r>
               <a:rPr lang="en-US" dirty="0"/>
-              <a:t>Multiple years experience </a:t>
-            </a:r>
-            <a:r>
-              <a:rPr lang="en-US" dirty="0" smtClean="0"/>
-              <a:t>for team members</a:t>
-            </a:r>
-            <a:endParaRPr lang="en-US" dirty="0"/>
-          </a:p>
-          <a:p>
-            <a:pPr lvl="1"/>
+              <a:t>Model must be closed &amp; complete</a:t>
+            </a:r>
+          </a:p>
+          <a:p>
             <a:endParaRPr lang="en-US" dirty="0"/>
           </a:p>
         </p:txBody>
@@ -3954,7 +3932,7 @@
     </p:spTree>
     <p:extLst>
       <p:ext uri="{BB962C8B-B14F-4D97-AF65-F5344CB8AC3E}">
-        <p14:creationId xmlns:p14="http://schemas.microsoft.com/office/powerpoint/2010/main" val="875602328"/>
+        <p14:creationId xmlns:p14="http://schemas.microsoft.com/office/powerpoint/2010/main" val="3457199183"/>
       </p:ext>
     </p:extLst>
   </p:cSld>
@@ -3998,7 +3976,158 @@
           <a:p>
             <a:r>
               <a:rPr lang="en-US" dirty="0" smtClean="0"/>
-              <a:t>Other Changes</a:t>
+              <a:t>Feedback Resolution</a:t>
+            </a:r>
+            <a:endParaRPr lang="en-US" dirty="0"/>
+          </a:p>
+        </p:txBody>
+      </p:sp>
+      <p:sp>
+        <p:nvSpPr>
+          <p:cNvPr id="3" name="Content Placeholder 2"/>
+          <p:cNvSpPr>
+            <a:spLocks noGrp="1"/>
+          </p:cNvSpPr>
+          <p:nvPr>
+            <p:ph idx="1"/>
+          </p:nvPr>
+        </p:nvSpPr>
+        <p:spPr/>
+        <p:txBody>
+          <a:bodyPr/>
+          <a:lstStyle/>
+          <a:p>
+            <a:r>
+              <a:rPr lang="en-US" sz="2400" dirty="0"/>
+              <a:t>Use Cases </a:t>
+            </a:r>
+            <a:r>
+              <a:rPr lang="en-US" sz="2400" dirty="0" smtClean="0"/>
+              <a:t>Feel Incomplete</a:t>
+            </a:r>
+            <a:endParaRPr lang="en-US" sz="2400" dirty="0" smtClean="0"/>
+          </a:p>
+          <a:p>
+            <a:pPr lvl="1"/>
+            <a:r>
+              <a:rPr lang="en-US" dirty="0" smtClean="0"/>
+              <a:t>Added new case: “Edit Printer Configuration”</a:t>
+            </a:r>
+          </a:p>
+          <a:p>
+            <a:pPr lvl="1"/>
+            <a:endParaRPr lang="en-US" dirty="0"/>
+          </a:p>
+          <a:p>
+            <a:r>
+              <a:rPr lang="en-US" sz="2400" dirty="0"/>
+              <a:t>Feasibility assumptions regarding </a:t>
+            </a:r>
+            <a:r>
+              <a:rPr lang="en-US" sz="2400" dirty="0" err="1"/>
+              <a:t>LoC</a:t>
+            </a:r>
+            <a:r>
+              <a:rPr lang="en-US" sz="2400" dirty="0"/>
+              <a:t> </a:t>
+            </a:r>
+            <a:r>
+              <a:rPr lang="en-US" sz="2400" dirty="0" smtClean="0"/>
+              <a:t>Production</a:t>
+            </a:r>
+            <a:endParaRPr lang="en-US" sz="2400" dirty="0" smtClean="0"/>
+          </a:p>
+          <a:p>
+            <a:pPr lvl="1"/>
+            <a:r>
+              <a:rPr lang="en-US" dirty="0" smtClean="0"/>
+              <a:t>Familiar with Tools</a:t>
+            </a:r>
+          </a:p>
+          <a:p>
+            <a:pPr lvl="2"/>
+            <a:r>
+              <a:rPr lang="en-US" dirty="0" smtClean="0"/>
+              <a:t>Interface largely Java</a:t>
+            </a:r>
+          </a:p>
+          <a:p>
+            <a:pPr lvl="2"/>
+            <a:r>
+              <a:rPr lang="en-US" dirty="0" smtClean="0"/>
+              <a:t>Processing in C</a:t>
+            </a:r>
+          </a:p>
+          <a:p>
+            <a:pPr lvl="1"/>
+            <a:r>
+              <a:rPr lang="en-US" dirty="0"/>
+              <a:t>Multiple years experience </a:t>
+            </a:r>
+            <a:r>
+              <a:rPr lang="en-US" dirty="0" smtClean="0"/>
+              <a:t>for team members</a:t>
+            </a:r>
+            <a:endParaRPr lang="en-US" dirty="0"/>
+          </a:p>
+          <a:p>
+            <a:pPr lvl="1"/>
+            <a:endParaRPr lang="en-US" dirty="0"/>
+          </a:p>
+        </p:txBody>
+      </p:sp>
+    </p:spTree>
+    <p:extLst>
+      <p:ext uri="{BB962C8B-B14F-4D97-AF65-F5344CB8AC3E}">
+        <p14:creationId xmlns:p14="http://schemas.microsoft.com/office/powerpoint/2010/main" val="875602328"/>
+      </p:ext>
+    </p:extLst>
+  </p:cSld>
+  <p:clrMapOvr>
+    <a:masterClrMapping/>
+  </p:clrMapOvr>
+</p:sld>
+</file>
+
+<file path=ppt/slides/slide7.xml><?xml version="1.0" encoding="utf-8"?>
+<p:sld xmlns:a="http://schemas.openxmlformats.org/drawingml/2006/main" xmlns:r="http://schemas.openxmlformats.org/officeDocument/2006/relationships" xmlns:p="http://schemas.openxmlformats.org/presentationml/2006/main">
+  <p:cSld>
+    <p:spTree>
+      <p:nvGrpSpPr>
+        <p:cNvPr id="1" name=""/>
+        <p:cNvGrpSpPr/>
+        <p:nvPr/>
+      </p:nvGrpSpPr>
+      <p:grpSpPr>
+        <a:xfrm>
+          <a:off x="0" y="0"/>
+          <a:ext cx="0" cy="0"/>
+          <a:chOff x="0" y="0"/>
+          <a:chExt cx="0" cy="0"/>
+        </a:xfrm>
+      </p:grpSpPr>
+      <p:sp>
+        <p:nvSpPr>
+          <p:cNvPr id="2" name="Title 1"/>
+          <p:cNvSpPr>
+            <a:spLocks noGrp="1"/>
+          </p:cNvSpPr>
+          <p:nvPr>
+            <p:ph type="title"/>
+          </p:nvPr>
+        </p:nvSpPr>
+        <p:spPr/>
+        <p:txBody>
+          <a:bodyPr/>
+          <a:lstStyle/>
+          <a:p>
+            <a:r>
+              <a:rPr lang="en-US" dirty="0" smtClean="0"/>
+              <a:t>Other </a:t>
+            </a:r>
+            <a:r>
+              <a:rPr lang="en-US" dirty="0" smtClean="0"/>
+              <a:t>Issues</a:t>
             </a:r>
             <a:endParaRPr lang="en-US" dirty="0"/>
           </a:p>
@@ -4099,7 +4228,7 @@
 </p:sld>
 </file>
 
-<file path=ppt/slides/slide7.xml><?xml version="1.0" encoding="utf-8"?>
+<file path=ppt/slides/slide8.xml><?xml version="1.0" encoding="utf-8"?>
 <p:sld xmlns:a="http://schemas.openxmlformats.org/drawingml/2006/main" xmlns:r="http://schemas.openxmlformats.org/officeDocument/2006/relationships" xmlns:p="http://schemas.openxmlformats.org/presentationml/2006/main">
   <p:cSld>
     <p:spTree>

</xml_diff>

<commit_message>
Changes wording on LOC estimate slide
</commit_message>
<xml_diff>
--- a/Status Updates/2013 11 14.pptx
+++ b/Status Updates/2013 11 14.pptx
@@ -3394,14 +3394,10 @@
           <a:p>
             <a:r>
               <a:rPr lang="en-US" sz="2800" dirty="0" smtClean="0"/>
-              <a:t>Use </a:t>
-            </a:r>
-            <a:r>
-              <a:rPr lang="en-US" sz="2800" smtClean="0"/>
-              <a:t>Cases </a:t>
-            </a:r>
-            <a:r>
-              <a:rPr lang="en-US" sz="2800" smtClean="0"/>
+              <a:t>Use Cases </a:t>
+            </a:r>
+            <a:r>
+              <a:rPr lang="en-US" sz="2800" dirty="0" smtClean="0"/>
               <a:t>feel </a:t>
             </a:r>
             <a:r>
@@ -4073,12 +4069,12 @@
           <a:p>
             <a:pPr lvl="1"/>
             <a:r>
-              <a:rPr lang="en-US" dirty="0"/>
-              <a:t>Multiple years experience </a:t>
-            </a:r>
-            <a:r>
               <a:rPr lang="en-US" dirty="0" smtClean="0"/>
-              <a:t>for team members</a:t>
+              <a:t>Team </a:t>
+            </a:r>
+            <a:r>
+              <a:rPr lang="en-US" smtClean="0"/>
+              <a:t>member experience</a:t>
             </a:r>
             <a:endParaRPr lang="en-US" dirty="0"/>
           </a:p>

</xml_diff>